<commit_message>
Correção da Aula 11 adicionado slide 9
</commit_message>
<xml_diff>
--- a/Aulas/Java + MySQL - Aula 11.pptx
+++ b/Aulas/Java + MySQL - Aula 11.pptx
@@ -13,9 +13,10 @@
     <p:sldId id="261" r:id="rId7"/>
     <p:sldId id="262" r:id="rId8"/>
     <p:sldId id="263" r:id="rId9"/>
-    <p:sldId id="264" r:id="rId10"/>
-    <p:sldId id="265" r:id="rId11"/>
-    <p:sldId id="266" r:id="rId12"/>
+    <p:sldId id="267" r:id="rId10"/>
+    <p:sldId id="264" r:id="rId11"/>
+    <p:sldId id="265" r:id="rId12"/>
+    <p:sldId id="266" r:id="rId13"/>
   </p:sldIdLst>
   <p:sldSz cx="12192000" cy="6858000"/>
   <p:notesSz cx="6858000" cy="9144000"/>
@@ -4241,6 +4242,106 @@
           <a:p>
             <a:r>
               <a:rPr lang="pt-BR" dirty="0" smtClean="0"/>
+              <a:t>Crie o método adicionar.</a:t>
+            </a:r>
+            <a:endParaRPr lang="pt-BR" dirty="0"/>
+          </a:p>
+        </p:txBody>
+      </p:sp>
+      <p:pic>
+        <p:nvPicPr>
+          <p:cNvPr id="6" name="Imagem 5"/>
+          <p:cNvPicPr>
+            <a:picLocks noChangeAspect="1"/>
+          </p:cNvPicPr>
+          <p:nvPr/>
+        </p:nvPicPr>
+        <p:blipFill>
+          <a:blip r:embed="rId2"/>
+          <a:stretch>
+            <a:fillRect/>
+          </a:stretch>
+        </p:blipFill>
+        <p:spPr>
+          <a:xfrm>
+            <a:off x="1857704" y="2523313"/>
+            <a:ext cx="7937938" cy="4196446"/>
+          </a:xfrm>
+          <a:prstGeom prst="rect">
+            <a:avLst/>
+          </a:prstGeom>
+        </p:spPr>
+      </p:pic>
+    </p:spTree>
+    <p:extLst>
+      <p:ext uri="{BB962C8B-B14F-4D97-AF65-F5344CB8AC3E}">
+        <p14:creationId xmlns:p14="http://schemas.microsoft.com/office/powerpoint/2010/main" val="858929378"/>
+      </p:ext>
+    </p:extLst>
+  </p:cSld>
+  <p:clrMapOvr>
+    <a:masterClrMapping/>
+  </p:clrMapOvr>
+</p:sld>
+</file>
+
+<file path=ppt/slides/slide11.xml><?xml version="1.0" encoding="utf-8"?>
+<p:sld xmlns:a="http://schemas.openxmlformats.org/drawingml/2006/main" xmlns:r="http://schemas.openxmlformats.org/officeDocument/2006/relationships" xmlns:p="http://schemas.openxmlformats.org/presentationml/2006/main">
+  <p:cSld>
+    <p:spTree>
+      <p:nvGrpSpPr>
+        <p:cNvPr id="1" name=""/>
+        <p:cNvGrpSpPr/>
+        <p:nvPr/>
+      </p:nvGrpSpPr>
+      <p:grpSpPr>
+        <a:xfrm>
+          <a:off x="0" y="0"/>
+          <a:ext cx="0" cy="0"/>
+          <a:chOff x="0" y="0"/>
+          <a:chExt cx="0" cy="0"/>
+        </a:xfrm>
+      </p:grpSpPr>
+      <p:sp>
+        <p:nvSpPr>
+          <p:cNvPr id="2" name="Título 1"/>
+          <p:cNvSpPr>
+            <a:spLocks noGrp="1"/>
+          </p:cNvSpPr>
+          <p:nvPr>
+            <p:ph type="title"/>
+          </p:nvPr>
+        </p:nvSpPr>
+        <p:spPr/>
+        <p:txBody>
+          <a:bodyPr/>
+          <a:lstStyle/>
+          <a:p>
+            <a:r>
+              <a:rPr lang="pt-BR" dirty="0" smtClean="0"/>
+              <a:t>Configurando o botão adicionar</a:t>
+            </a:r>
+            <a:endParaRPr lang="pt-BR" dirty="0"/>
+          </a:p>
+        </p:txBody>
+      </p:sp>
+      <p:sp>
+        <p:nvSpPr>
+          <p:cNvPr id="3" name="Espaço Reservado para Conteúdo 2"/>
+          <p:cNvSpPr>
+            <a:spLocks noGrp="1"/>
+          </p:cNvSpPr>
+          <p:nvPr>
+            <p:ph idx="1"/>
+          </p:nvPr>
+        </p:nvSpPr>
+        <p:spPr/>
+        <p:txBody>
+          <a:bodyPr/>
+          <a:lstStyle/>
+          <a:p>
+            <a:r>
+              <a:rPr lang="pt-BR" dirty="0" smtClean="0"/>
               <a:t>Crie o evento do botão adicionar.</a:t>
             </a:r>
             <a:endParaRPr lang="pt-BR" dirty="0"/>
@@ -4307,7 +4408,7 @@
 </p:sld>
 </file>
 
-<file path=ppt/slides/slide11.xml><?xml version="1.0" encoding="utf-8"?>
+<file path=ppt/slides/slide12.xml><?xml version="1.0" encoding="utf-8"?>
 <p:sld xmlns:a="http://schemas.openxmlformats.org/drawingml/2006/main" xmlns:r="http://schemas.openxmlformats.org/officeDocument/2006/relationships" xmlns:p="http://schemas.openxmlformats.org/presentationml/2006/main">
   <p:cSld>
     <p:spTree>
@@ -5264,7 +5365,11 @@
           <a:p>
             <a:r>
               <a:rPr lang="pt-BR" dirty="0" smtClean="0"/>
-              <a:t>Crie o método adicionar.</a:t>
+              <a:t>Instanciar o método construtor </a:t>
+            </a:r>
+            <a:r>
+              <a:rPr lang="pt-BR" smtClean="0"/>
+              <a:t>da classe.</a:t>
             </a:r>
             <a:endParaRPr lang="pt-BR" dirty="0"/>
           </a:p>
@@ -5272,7 +5377,7 @@
       </p:sp>
       <p:pic>
         <p:nvPicPr>
-          <p:cNvPr id="6" name="Imagem 5"/>
+          <p:cNvPr id="4" name="Imagem 3"/>
           <p:cNvPicPr>
             <a:picLocks noChangeAspect="1"/>
           </p:cNvPicPr>
@@ -5286,8 +5391,8 @@
         </p:blipFill>
         <p:spPr>
           <a:xfrm>
-            <a:off x="1857704" y="2523313"/>
-            <a:ext cx="7937938" cy="4196446"/>
+            <a:off x="1028221" y="2857642"/>
+            <a:ext cx="10020779" cy="2328248"/>
           </a:xfrm>
           <a:prstGeom prst="rect">
             <a:avLst/>
@@ -5297,7 +5402,7 @@
     </p:spTree>
     <p:extLst>
       <p:ext uri="{BB962C8B-B14F-4D97-AF65-F5344CB8AC3E}">
-        <p14:creationId xmlns:p14="http://schemas.microsoft.com/office/powerpoint/2010/main" val="858929378"/>
+        <p14:creationId xmlns:p14="http://schemas.microsoft.com/office/powerpoint/2010/main" val="122865797"/>
       </p:ext>
     </p:extLst>
   </p:cSld>

</xml_diff>